<commit_message>
add final slide to confidence.pptx
</commit_message>
<xml_diff>
--- a/spring13/slides13/confidence.pptx
+++ b/spring13/slides13/confidence.pptx
@@ -5,10 +5,10 @@
     <p:sldMasterId id="2147483649" r:id="rId1"/>
   </p:sldMasterIdLst>
   <p:notesMasterIdLst>
-    <p:notesMasterId r:id="rId20"/>
+    <p:notesMasterId r:id="rId21"/>
   </p:notesMasterIdLst>
   <p:handoutMasterIdLst>
-    <p:handoutMasterId r:id="rId21"/>
+    <p:handoutMasterId r:id="rId22"/>
   </p:handoutMasterIdLst>
   <p:sldIdLst>
     <p:sldId id="454" r:id="rId2"/>
@@ -29,11 +29,12 @@
     <p:sldId id="401" r:id="rId17"/>
     <p:sldId id="422" r:id="rId18"/>
     <p:sldId id="485" r:id="rId19"/>
+    <p:sldId id="553" r:id="rId20"/>
   </p:sldIdLst>
   <p:sldSz cx="9144000" cy="6858000" type="screen4x3"/>
   <p:notesSz cx="9601200" cy="7315200"/>
   <p:custDataLst>
-    <p:tags r:id="rId23"/>
+    <p:tags r:id="rId24"/>
   </p:custDataLst>
   <p:defaultTextStyle>
     <a:defPPr>
@@ -1755,6 +1756,93 @@
                 <a:defRPr/>
               </a:pPr>
               <a:t>18</a:t>
+            </a:fld>
+            <a:endParaRPr lang="en-US"/>
+          </a:p>
+        </p:txBody>
+      </p:sp>
+    </p:spTree>
+  </p:cSld>
+  <p:clrMapOvr>
+    <a:masterClrMapping/>
+  </p:clrMapOvr>
+</p:notes>
+</file>
+
+<file path=ppt/notesSlides/notesSlide19.xml><?xml version="1.0" encoding="utf-8"?>
+<p:notes xmlns:a="http://schemas.openxmlformats.org/drawingml/2006/main" xmlns:r="http://schemas.openxmlformats.org/officeDocument/2006/relationships" xmlns:p="http://schemas.openxmlformats.org/presentationml/2006/main">
+  <p:cSld>
+    <p:spTree>
+      <p:nvGrpSpPr>
+        <p:cNvPr id="1" name=""/>
+        <p:cNvGrpSpPr/>
+        <p:nvPr/>
+      </p:nvGrpSpPr>
+      <p:grpSpPr>
+        <a:xfrm>
+          <a:off x="0" y="0"/>
+          <a:ext cx="0" cy="0"/>
+          <a:chOff x="0" y="0"/>
+          <a:chExt cx="0" cy="0"/>
+        </a:xfrm>
+      </p:grpSpPr>
+      <p:sp>
+        <p:nvSpPr>
+          <p:cNvPr id="2" name="Slide Image Placeholder 1"/>
+          <p:cNvSpPr>
+            <a:spLocks noGrp="1" noRot="1" noChangeAspect="1"/>
+          </p:cNvSpPr>
+          <p:nvPr>
+            <p:ph type="sldImg"/>
+          </p:nvPr>
+        </p:nvSpPr>
+        <p:spPr/>
+      </p:sp>
+      <p:sp>
+        <p:nvSpPr>
+          <p:cNvPr id="3" name="Notes Placeholder 2"/>
+          <p:cNvSpPr>
+            <a:spLocks noGrp="1"/>
+          </p:cNvSpPr>
+          <p:nvPr>
+            <p:ph type="body" idx="1"/>
+          </p:nvPr>
+        </p:nvSpPr>
+        <p:spPr/>
+        <p:txBody>
+          <a:bodyPr>
+            <a:normAutofit/>
+          </a:bodyPr>
+          <a:lstStyle/>
+          <a:p>
+            <a:endParaRPr lang="en-US"/>
+          </a:p>
+        </p:txBody>
+      </p:sp>
+      <p:sp>
+        <p:nvSpPr>
+          <p:cNvPr id="4" name="Slide Number Placeholder 3"/>
+          <p:cNvSpPr>
+            <a:spLocks noGrp="1"/>
+          </p:cNvSpPr>
+          <p:nvPr>
+            <p:ph type="sldNum" sz="quarter" idx="10"/>
+          </p:nvPr>
+        </p:nvSpPr>
+        <p:spPr/>
+        <p:txBody>
+          <a:bodyPr/>
+          <a:lstStyle/>
+          <a:p>
+            <a:pPr>
+              <a:defRPr/>
+            </a:pPr>
+            <a:fld id="{441E3F6F-A8F9-4C39-8C62-F077DEAEAA0F}" type="slidenum">
+              <a:rPr lang="en-US" smtClean="0"/>
+              <a:pPr>
+                <a:defRPr/>
+              </a:pPr>
+              <a:t>19</a:t>
             </a:fld>
             <a:endParaRPr lang="en-US"/>
           </a:p>
@@ -4259,6 +4347,14 @@
   <p:clrMapOvr>
     <a:masterClrMapping/>
   </p:clrMapOvr>
+  <mc:AlternateContent xmlns:mc="http://schemas.openxmlformats.org/markup-compatibility/2006">
+    <mc:Choice xmlns:p14="http://schemas.microsoft.com/office/powerpoint/2010/main" Requires="p14">
+      <p:transition spd="slow" p14:dur="2000" advClick="0"/>
+    </mc:Choice>
+    <mc:Fallback>
+      <p:transition xmlns:p14="http://schemas.microsoft.com/office/powerpoint/2010/main" spd="slow" advClick="0"/>
+    </mc:Fallback>
+  </mc:AlternateContent>
   <p:timing>
     <p:tnLst>
       <p:par>
@@ -4513,7 +4609,7 @@
           <a:graphicData uri="http://schemas.openxmlformats.org/presentationml/2006/ole">
             <mc:AlternateContent xmlns:mc="http://schemas.openxmlformats.org/markup-compatibility/2006">
               <mc:Choice xmlns:v="urn:schemas-microsoft-com:vml" Requires="v">
-                <p:oleObj spid="_x0000_s438473" name="Equation" r:id="rId4" imgW="889000" imgH="469900" progId="Equation.DSMT4">
+                <p:oleObj spid="_x0000_s438480" name="Equation" r:id="rId4" imgW="889000" imgH="469900" progId="Equation.DSMT4">
                   <p:embed/>
                 </p:oleObj>
               </mc:Choice>
@@ -4583,7 +4679,7 @@
           <a:graphicData uri="http://schemas.openxmlformats.org/presentationml/2006/ole">
             <mc:AlternateContent xmlns:mc="http://schemas.openxmlformats.org/markup-compatibility/2006">
               <mc:Choice xmlns:v="urn:schemas-microsoft-com:vml" Requires="v">
-                <p:oleObj spid="_x0000_s438474" name="Equation" r:id="rId6" imgW="1879600" imgH="215900" progId="Equation.DSMT4">
+                <p:oleObj spid="_x0000_s438481" name="Equation" r:id="rId6" imgW="1879600" imgH="215900" progId="Equation.DSMT4">
                   <p:embed/>
                 </p:oleObj>
               </mc:Choice>
@@ -4659,7 +4755,7 @@
           <a:graphicData uri="http://schemas.openxmlformats.org/presentationml/2006/ole">
             <mc:AlternateContent xmlns:mc="http://schemas.openxmlformats.org/markup-compatibility/2006">
               <mc:Choice xmlns:v="urn:schemas-microsoft-com:vml" Requires="v">
-                <p:oleObj spid="_x0000_s438475" name="Equation" r:id="rId8" imgW="2057400" imgH="596900" progId="Equation.DSMT4">
+                <p:oleObj spid="_x0000_s438482" name="Equation" r:id="rId8" imgW="2057400" imgH="596900" progId="Equation.DSMT4">
                   <p:embed/>
                 </p:oleObj>
               </mc:Choice>
@@ -5059,7 +5155,7 @@
           <a:graphicData uri="http://schemas.openxmlformats.org/presentationml/2006/ole">
             <mc:AlternateContent xmlns:mc="http://schemas.openxmlformats.org/markup-compatibility/2006">
               <mc:Choice xmlns:v="urn:schemas-microsoft-com:vml" Requires="v">
-                <p:oleObj spid="_x0000_s493671" name="Equation" r:id="rId4" imgW="1155700" imgH="596900" progId="Equation.DSMT4">
+                <p:oleObj spid="_x0000_s493678" name="Equation" r:id="rId4" imgW="1155700" imgH="596900" progId="Equation.DSMT4">
                   <p:embed/>
                 </p:oleObj>
               </mc:Choice>
@@ -5122,7 +5218,7 @@
           <a:graphicData uri="http://schemas.openxmlformats.org/presentationml/2006/ole">
             <mc:AlternateContent xmlns:mc="http://schemas.openxmlformats.org/markup-compatibility/2006">
               <mc:Choice xmlns:v="urn:schemas-microsoft-com:vml" Requires="v">
-                <p:oleObj spid="_x0000_s493672" name="Equation" r:id="rId6" imgW="1828800" imgH="292100" progId="Equation.DSMT4">
+                <p:oleObj spid="_x0000_s493679" name="Equation" r:id="rId6" imgW="1828800" imgH="292100" progId="Equation.DSMT4">
                   <p:embed/>
                 </p:oleObj>
               </mc:Choice>
@@ -5192,7 +5288,7 @@
           <a:graphicData uri="http://schemas.openxmlformats.org/presentationml/2006/ole">
             <mc:AlternateContent xmlns:mc="http://schemas.openxmlformats.org/markup-compatibility/2006">
               <mc:Choice xmlns:v="urn:schemas-microsoft-com:vml" Requires="v">
-                <p:oleObj spid="_x0000_s493673" name="Equation" r:id="rId8" imgW="1346200" imgH="292100" progId="Equation.DSMT4">
+                <p:oleObj spid="_x0000_s493680" name="Equation" r:id="rId8" imgW="1346200" imgH="292100" progId="Equation.DSMT4">
                   <p:embed/>
                 </p:oleObj>
               </mc:Choice>
@@ -5243,13 +5339,13 @@
   <p:clrMapOvr>
     <a:masterClrMapping/>
   </p:clrMapOvr>
-  <mc:AlternateContent xmlns:mc="http://schemas.openxmlformats.org/markup-compatibility/2006">
-    <mc:Choice xmlns:p14="http://schemas.microsoft.com/office/powerpoint/2010/main" Requires="p14">
+  <mc:AlternateContent xmlns:mc="http://schemas.openxmlformats.org/markup-compatibility/2006" xmlns:p14="http://schemas.microsoft.com/office/powerpoint/2010/main">
+    <mc:Choice Requires="p14">
       <p:transition spd="slow" p14:dur="800" advClick="0">
         <p:fade/>
       </p:transition>
     </mc:Choice>
-    <mc:Fallback>
+    <mc:Fallback xmlns="">
       <p:transition xmlns:p14="http://schemas.microsoft.com/office/powerpoint/2010/main" spd="slow" advClick="0">
         <p:fade/>
       </p:transition>
@@ -5880,13 +5976,13 @@
   <p:clrMapOvr>
     <a:masterClrMapping/>
   </p:clrMapOvr>
-  <mc:AlternateContent xmlns:mc="http://schemas.openxmlformats.org/markup-compatibility/2006">
-    <mc:Choice xmlns:p14="http://schemas.microsoft.com/office/powerpoint/2010/main" Requires="p14">
+  <mc:AlternateContent xmlns:mc="http://schemas.openxmlformats.org/markup-compatibility/2006" xmlns:p14="http://schemas.microsoft.com/office/powerpoint/2010/main">
+    <mc:Choice Requires="p14">
       <p:transition spd="slow" p14:dur="1200" advClick="0">
         <p:fade thruBlk="1"/>
       </p:transition>
     </mc:Choice>
-    <mc:Fallback>
+    <mc:Fallback xmlns="">
       <p:transition xmlns:p14="http://schemas.microsoft.com/office/powerpoint/2010/main" spd="slow" advClick="0">
         <p:fade thruBlk="1"/>
       </p:transition>
@@ -6843,7 +6939,7 @@
         </p:nvSpPr>
         <p:spPr bwMode="auto">
           <a:xfrm>
-            <a:off x="228600" y="1371600"/>
+            <a:off x="228600" y="1143000"/>
             <a:ext cx="8610600" cy="4832092"/>
           </a:xfrm>
           <a:prstGeom prst="rect">
@@ -7963,16 +8059,10 @@
           <a:p>
             <a:pPr algn="l"/>
             <a:r>
-              <a:rPr lang="en-US" sz="5400" dirty="0">
-                <a:latin typeface="Comic Sans MS" pitchFamily="66" charset="0"/>
-              </a:rPr>
-              <a:t>f</a:t>
-            </a:r>
-            <a:r>
               <a:rPr lang="en-US" sz="5400" dirty="0" smtClean="0">
                 <a:latin typeface="Comic Sans MS" pitchFamily="66" charset="0"/>
               </a:rPr>
-              <a:t>or </a:t>
+              <a:t>For </a:t>
             </a:r>
             <a:r>
               <a:rPr lang="en-US" sz="5400" dirty="0">
@@ -8223,14 +8313,14 @@
   <p:clrMapOvr>
     <a:masterClrMapping/>
   </p:clrMapOvr>
-  <mc:AlternateContent xmlns:mc="http://schemas.openxmlformats.org/markup-compatibility/2006" xmlns:p14="http://schemas.microsoft.com/office/powerpoint/2010/main">
-    <mc:Choice Requires="p14">
-      <p:transition spd="med" p14:dur="700">
+  <mc:AlternateContent xmlns:mc="http://schemas.openxmlformats.org/markup-compatibility/2006">
+    <mc:Choice xmlns:p14="http://schemas.microsoft.com/office/powerpoint/2010/main" Requires="p14">
+      <p:transition spd="med" p14:dur="700" advClick="0">
         <p:fade/>
       </p:transition>
     </mc:Choice>
-    <mc:Fallback xmlns="">
-      <p:transition xmlns:p14="http://schemas.microsoft.com/office/powerpoint/2010/main" spd="med">
+    <mc:Fallback>
+      <p:transition xmlns:p14="http://schemas.microsoft.com/office/powerpoint/2010/main" spd="med" advClick="0">
         <p:fade/>
       </p:transition>
     </mc:Fallback>
@@ -8713,8 +8803,8 @@
   <p:clrMapOvr>
     <a:masterClrMapping/>
   </p:clrMapOvr>
-  <p:transition xmlns:p14="http://schemas.microsoft.com/office/powerpoint/2010/main">
-    <p:fade/>
+  <p:transition xmlns:p14="http://schemas.microsoft.com/office/powerpoint/2010/main" spd="slow" advClick="0">
+    <p:fade thruBlk="1"/>
   </p:transition>
   <p:timing>
     <p:tnLst>
@@ -8805,6 +8895,207 @@
 </p:sld>
 </file>
 
+<file path=ppt/slides/slide19.xml><?xml version="1.0" encoding="utf-8"?>
+<p:sld xmlns:a="http://schemas.openxmlformats.org/drawingml/2006/main" xmlns:r="http://schemas.openxmlformats.org/officeDocument/2006/relationships" xmlns:p="http://schemas.openxmlformats.org/presentationml/2006/main">
+  <p:cSld>
+    <p:spTree>
+      <p:nvGrpSpPr>
+        <p:cNvPr id="1" name=""/>
+        <p:cNvGrpSpPr/>
+        <p:nvPr/>
+      </p:nvGrpSpPr>
+      <p:grpSpPr>
+        <a:xfrm>
+          <a:off x="0" y="0"/>
+          <a:ext cx="0" cy="0"/>
+          <a:chOff x="0" y="0"/>
+          <a:chExt cx="0" cy="0"/>
+        </a:xfrm>
+      </p:grpSpPr>
+      <p:sp>
+        <p:nvSpPr>
+          <p:cNvPr id="3" name="Content Placeholder 2"/>
+          <p:cNvSpPr>
+            <a:spLocks noGrp="1"/>
+          </p:cNvSpPr>
+          <p:nvPr>
+            <p:ph idx="1"/>
+          </p:nvPr>
+        </p:nvSpPr>
+        <p:spPr>
+          <a:xfrm>
+            <a:off x="152400" y="1066800"/>
+            <a:ext cx="8839200" cy="5334000"/>
+          </a:xfrm>
+        </p:spPr>
+        <p:txBody>
+          <a:bodyPr/>
+          <a:lstStyle/>
+          <a:p>
+            <a:r>
+              <a:rPr lang="en-US" sz="4800" dirty="0" smtClean="0">
+                <a:solidFill>
+                  <a:srgbClr val="006600"/>
+                </a:solidFill>
+              </a:rPr>
+              <a:t>Moral:</a:t>
+            </a:r>
+            <a:r>
+              <a:rPr lang="en-US" sz="4800" dirty="0" smtClean="0"/>
+              <a:t> </a:t>
+            </a:r>
+            <a:r>
+              <a:rPr lang="en-US" sz="4800" dirty="0"/>
+              <a:t>Also ask “Why am I</a:t>
+            </a:r>
+          </a:p>
+          <a:p>
+            <a:r>
+              <a:rPr lang="en-US" sz="4800" dirty="0"/>
+              <a:t>hearing about this particular </a:t>
+            </a:r>
+          </a:p>
+          <a:p>
+            <a:r>
+              <a:rPr lang="en-US" sz="4800" dirty="0"/>
+              <a:t>experiment?  How many </a:t>
+            </a:r>
+          </a:p>
+          <a:p>
+            <a:r>
+              <a:rPr lang="en-US" sz="4800" dirty="0"/>
+              <a:t>others were tried and not</a:t>
+            </a:r>
+          </a:p>
+          <a:p>
+            <a:r>
+              <a:rPr lang="en-US" sz="4800" dirty="0"/>
+              <a:t>reported?” </a:t>
+            </a:r>
+            <a:endParaRPr lang="en-US" sz="4800" dirty="0" smtClean="0"/>
+          </a:p>
+          <a:p>
+            <a:pPr algn="ctr"/>
+            <a:r>
+              <a:rPr lang="en-US" sz="4800" dirty="0"/>
+              <a:t>See </a:t>
+            </a:r>
+            <a:r>
+              <a:rPr lang="en-US" sz="4800" dirty="0">
+                <a:solidFill>
+                  <a:srgbClr val="660066"/>
+                </a:solidFill>
+              </a:rPr>
+              <a:t>http://</a:t>
+            </a:r>
+            <a:r>
+              <a:rPr lang="en-US" sz="4800" dirty="0" err="1">
+                <a:solidFill>
+                  <a:srgbClr val="660066"/>
+                </a:solidFill>
+              </a:rPr>
+              <a:t>xkcd.com</a:t>
+            </a:r>
+            <a:r>
+              <a:rPr lang="en-US" sz="4800" dirty="0">
+                <a:solidFill>
+                  <a:srgbClr val="660066"/>
+                </a:solidFill>
+              </a:rPr>
+              <a:t>/882/</a:t>
+            </a:r>
+          </a:p>
+        </p:txBody>
+      </p:sp>
+      <p:sp>
+        <p:nvSpPr>
+          <p:cNvPr id="4" name="Slide Number Placeholder 3"/>
+          <p:cNvSpPr>
+            <a:spLocks noGrp="1"/>
+          </p:cNvSpPr>
+          <p:nvPr>
+            <p:ph type="sldNum" sz="quarter" idx="10"/>
+          </p:nvPr>
+        </p:nvSpPr>
+        <p:spPr/>
+        <p:txBody>
+          <a:bodyPr/>
+          <a:lstStyle/>
+          <a:p>
+            <a:pPr>
+              <a:defRPr/>
+            </a:pPr>
+            <a:r>
+              <a:rPr lang="en-US" dirty="0" smtClean="0"/>
+              <a:t>confidence.</a:t>
+            </a:r>
+            <a:fld id="{E78F4000-603A-43A9-9772-EA15786EFD2C}" type="slidenum">
+              <a:rPr lang="en-US" smtClean="0"/>
+              <a:pPr>
+                <a:defRPr/>
+              </a:pPr>
+              <a:t>19</a:t>
+            </a:fld>
+            <a:endParaRPr lang="en-US" dirty="0"/>
+          </a:p>
+        </p:txBody>
+      </p:sp>
+      <p:sp>
+        <p:nvSpPr>
+          <p:cNvPr id="7" name="Rectangle 3"/>
+          <p:cNvSpPr>
+            <a:spLocks noGrp="1" noChangeArrowheads="1"/>
+          </p:cNvSpPr>
+          <p:nvPr>
+            <p:ph type="title"/>
+          </p:nvPr>
+        </p:nvSpPr>
+        <p:spPr>
+          <a:xfrm>
+            <a:off x="1905000" y="228600"/>
+            <a:ext cx="5334000" cy="990600"/>
+          </a:xfrm>
+          <a:noFill/>
+        </p:spPr>
+        <p:txBody>
+          <a:bodyPr/>
+          <a:lstStyle/>
+          <a:p>
+            <a:pPr eaLnBrk="1" hangingPunct="1"/>
+            <a:r>
+              <a:rPr lang="en-US" sz="4800" dirty="0" smtClean="0">
+                <a:solidFill>
+                  <a:srgbClr val="0006FE"/>
+                </a:solidFill>
+              </a:rPr>
+              <a:t>Confidence</a:t>
+            </a:r>
+          </a:p>
+        </p:txBody>
+      </p:sp>
+    </p:spTree>
+    <p:extLst>
+      <p:ext uri="{BB962C8B-B14F-4D97-AF65-F5344CB8AC3E}">
+        <p14:creationId xmlns:p14="http://schemas.microsoft.com/office/powerpoint/2010/main" val="1923841103"/>
+      </p:ext>
+    </p:extLst>
+  </p:cSld>
+  <p:clrMapOvr>
+    <a:masterClrMapping/>
+  </p:clrMapOvr>
+  <p:transition xmlns:p14="http://schemas.microsoft.com/office/powerpoint/2010/main">
+    <p:fade/>
+  </p:transition>
+  <p:timing>
+    <p:tnLst>
+      <p:par>
+        <p:cTn xmlns:p14="http://schemas.microsoft.com/office/powerpoint/2010/main" id="1" dur="indefinite" restart="never" nodeType="tmRoot"/>
+      </p:par>
+    </p:tnLst>
+  </p:timing>
+</p:sld>
+</file>
+
 <file path=ppt/slides/slide2.xml><?xml version="1.0" encoding="utf-8"?>
 <p:sld xmlns:a="http://schemas.openxmlformats.org/drawingml/2006/main" xmlns:r="http://schemas.openxmlformats.org/officeDocument/2006/relationships" xmlns:p="http://schemas.openxmlformats.org/presentationml/2006/main">
   <p:cSld>
@@ -9143,7 +9434,7 @@
           <a:graphicData uri="http://schemas.openxmlformats.org/presentationml/2006/ole">
             <mc:AlternateContent xmlns:mc="http://schemas.openxmlformats.org/markup-compatibility/2006">
               <mc:Choice xmlns:v="urn:schemas-microsoft-com:vml" Requires="v">
-                <p:oleObj spid="_x0000_s1048" name="Equation" r:id="rId5" imgW="1828800" imgH="292100" progId="Equation.DSMT4">
+                <p:oleObj spid="_x0000_s1053" name="Equation" r:id="rId5" imgW="1828800" imgH="292100" progId="Equation.DSMT4">
                   <p:embed/>
                 </p:oleObj>
               </mc:Choice>
@@ -9213,7 +9504,7 @@
           <a:graphicData uri="http://schemas.openxmlformats.org/presentationml/2006/ole">
             <mc:AlternateContent xmlns:mc="http://schemas.openxmlformats.org/markup-compatibility/2006">
               <mc:Choice xmlns:v="urn:schemas-microsoft-com:vml" Requires="v">
-                <p:oleObj spid="_x0000_s1049" name="Equation" r:id="rId7" imgW="1828800" imgH="596900" progId="Equation.DSMT4">
+                <p:oleObj spid="_x0000_s1054" name="Equation" r:id="rId7" imgW="1828800" imgH="596900" progId="Equation.DSMT4">
                   <p:embed/>
                 </p:oleObj>
               </mc:Choice>
@@ -9572,13 +9863,13 @@
   <p:clrMapOvr>
     <a:masterClrMapping/>
   </p:clrMapOvr>
-  <mc:AlternateContent xmlns:mc="http://schemas.openxmlformats.org/markup-compatibility/2006">
-    <mc:Choice xmlns:p14="http://schemas.microsoft.com/office/powerpoint/2010/main" Requires="p14">
+  <mc:AlternateContent xmlns:mc="http://schemas.openxmlformats.org/markup-compatibility/2006" xmlns:p14="http://schemas.microsoft.com/office/powerpoint/2010/main">
+    <mc:Choice Requires="p14">
       <p:transition spd="slow" p14:dur="1200" advClick="0">
         <p:fade thruBlk="1"/>
       </p:transition>
     </mc:Choice>
-    <mc:Fallback>
+    <mc:Fallback xmlns="">
       <p:transition xmlns:p14="http://schemas.microsoft.com/office/powerpoint/2010/main" spd="slow" advClick="0">
         <p:fade thruBlk="1"/>
       </p:transition>
@@ -11573,7 +11864,7 @@
           <a:graphicData uri="http://schemas.openxmlformats.org/presentationml/2006/ole">
             <mc:AlternateContent xmlns:mc="http://schemas.openxmlformats.org/markup-compatibility/2006">
               <mc:Choice xmlns:v="urn:schemas-microsoft-com:vml" Requires="v">
-                <p:oleObj spid="_x0000_s426154" name="Equation" r:id="rId4" imgW="1866900" imgH="596900" progId="Equation.DSMT4">
+                <p:oleObj spid="_x0000_s426159" name="Equation" r:id="rId4" imgW="1866900" imgH="596900" progId="Equation.DSMT4">
                   <p:embed/>
                 </p:oleObj>
               </mc:Choice>
@@ -11672,7 +11963,7 @@
           <a:graphicData uri="http://schemas.openxmlformats.org/presentationml/2006/ole">
             <mc:AlternateContent xmlns:mc="http://schemas.openxmlformats.org/markup-compatibility/2006">
               <mc:Choice xmlns:v="urn:schemas-microsoft-com:vml" Requires="v">
-                <p:oleObj spid="_x0000_s426155" name="Equation" r:id="rId6" imgW="1866900" imgH="215900" progId="Equation.DSMT4">
+                <p:oleObj spid="_x0000_s426160" name="Equation" r:id="rId6" imgW="1866900" imgH="215900" progId="Equation.DSMT4">
                   <p:embed/>
                 </p:oleObj>
               </mc:Choice>
@@ -11891,7 +12182,7 @@
           <a:graphicData uri="http://schemas.openxmlformats.org/presentationml/2006/ole">
             <mc:AlternateContent xmlns:mc="http://schemas.openxmlformats.org/markup-compatibility/2006">
               <mc:Choice xmlns:v="urn:schemas-microsoft-com:vml" Requires="v">
-                <p:oleObj spid="_x0000_s494620" name="Equation" r:id="rId4" imgW="2057400" imgH="596900" progId="Equation.DSMT4">
+                <p:oleObj spid="_x0000_s494625" name="Equation" r:id="rId4" imgW="2057400" imgH="596900" progId="Equation.DSMT4">
                   <p:embed/>
                 </p:oleObj>
               </mc:Choice>
@@ -11991,7 +12282,7 @@
           <a:graphicData uri="http://schemas.openxmlformats.org/presentationml/2006/ole">
             <mc:AlternateContent xmlns:mc="http://schemas.openxmlformats.org/markup-compatibility/2006">
               <mc:Choice xmlns:v="urn:schemas-microsoft-com:vml" Requires="v">
-                <p:oleObj spid="_x0000_s494621" name="Equation" r:id="rId6" imgW="1866900" imgH="215900" progId="Equation.DSMT4">
+                <p:oleObj spid="_x0000_s494626" name="Equation" r:id="rId6" imgW="1866900" imgH="215900" progId="Equation.DSMT4">
                   <p:embed/>
                 </p:oleObj>
               </mc:Choice>

</xml_diff>

<commit_message>
add microquiz14w.pptx exit-survey, edit gambler slides
</commit_message>
<xml_diff>
--- a/spring13/slides13/confidence.pptx
+++ b/spring13/slides13/confidence.pptx
@@ -4347,11 +4347,11 @@
   <p:clrMapOvr>
     <a:masterClrMapping/>
   </p:clrMapOvr>
-  <mc:AlternateContent xmlns:mc="http://schemas.openxmlformats.org/markup-compatibility/2006">
-    <mc:Choice xmlns:p14="http://schemas.microsoft.com/office/powerpoint/2010/main" Requires="p14">
+  <mc:AlternateContent xmlns:mc="http://schemas.openxmlformats.org/markup-compatibility/2006" xmlns:p14="http://schemas.microsoft.com/office/powerpoint/2010/main">
+    <mc:Choice Requires="p14">
       <p:transition spd="slow" p14:dur="2000" advClick="0"/>
     </mc:Choice>
-    <mc:Fallback>
+    <mc:Fallback xmlns="">
       <p:transition xmlns:p14="http://schemas.microsoft.com/office/powerpoint/2010/main" spd="slow" advClick="0"/>
     </mc:Fallback>
   </mc:AlternateContent>
@@ -4609,7 +4609,7 @@
           <a:graphicData uri="http://schemas.openxmlformats.org/presentationml/2006/ole">
             <mc:AlternateContent xmlns:mc="http://schemas.openxmlformats.org/markup-compatibility/2006">
               <mc:Choice xmlns:v="urn:schemas-microsoft-com:vml" Requires="v">
-                <p:oleObj spid="_x0000_s438480" name="Equation" r:id="rId4" imgW="889000" imgH="469900" progId="Equation.DSMT4">
+                <p:oleObj spid="_x0000_s438487" name="Equation" r:id="rId4" imgW="889000" imgH="469900" progId="Equation.DSMT4">
                   <p:embed/>
                 </p:oleObj>
               </mc:Choice>
@@ -4679,7 +4679,7 @@
           <a:graphicData uri="http://schemas.openxmlformats.org/presentationml/2006/ole">
             <mc:AlternateContent xmlns:mc="http://schemas.openxmlformats.org/markup-compatibility/2006">
               <mc:Choice xmlns:v="urn:schemas-microsoft-com:vml" Requires="v">
-                <p:oleObj spid="_x0000_s438481" name="Equation" r:id="rId6" imgW="1879600" imgH="215900" progId="Equation.DSMT4">
+                <p:oleObj spid="_x0000_s438488" name="Equation" r:id="rId6" imgW="1879600" imgH="215900" progId="Equation.DSMT4">
                   <p:embed/>
                 </p:oleObj>
               </mc:Choice>
@@ -4755,7 +4755,7 @@
           <a:graphicData uri="http://schemas.openxmlformats.org/presentationml/2006/ole">
             <mc:AlternateContent xmlns:mc="http://schemas.openxmlformats.org/markup-compatibility/2006">
               <mc:Choice xmlns:v="urn:schemas-microsoft-com:vml" Requires="v">
-                <p:oleObj spid="_x0000_s438482" name="Equation" r:id="rId8" imgW="2057400" imgH="596900" progId="Equation.DSMT4">
+                <p:oleObj spid="_x0000_s438489" name="Equation" r:id="rId8" imgW="2057400" imgH="596900" progId="Equation.DSMT4">
                   <p:embed/>
                 </p:oleObj>
               </mc:Choice>
@@ -5155,7 +5155,7 @@
           <a:graphicData uri="http://schemas.openxmlformats.org/presentationml/2006/ole">
             <mc:AlternateContent xmlns:mc="http://schemas.openxmlformats.org/markup-compatibility/2006">
               <mc:Choice xmlns:v="urn:schemas-microsoft-com:vml" Requires="v">
-                <p:oleObj spid="_x0000_s493678" name="Equation" r:id="rId4" imgW="1155700" imgH="596900" progId="Equation.DSMT4">
+                <p:oleObj spid="_x0000_s493685" name="Equation" r:id="rId4" imgW="1155700" imgH="596900" progId="Equation.DSMT4">
                   <p:embed/>
                 </p:oleObj>
               </mc:Choice>
@@ -5218,7 +5218,7 @@
           <a:graphicData uri="http://schemas.openxmlformats.org/presentationml/2006/ole">
             <mc:AlternateContent xmlns:mc="http://schemas.openxmlformats.org/markup-compatibility/2006">
               <mc:Choice xmlns:v="urn:schemas-microsoft-com:vml" Requires="v">
-                <p:oleObj spid="_x0000_s493679" name="Equation" r:id="rId6" imgW="1828800" imgH="292100" progId="Equation.DSMT4">
+                <p:oleObj spid="_x0000_s493686" name="Equation" r:id="rId6" imgW="1828800" imgH="292100" progId="Equation.DSMT4">
                   <p:embed/>
                 </p:oleObj>
               </mc:Choice>
@@ -5288,7 +5288,7 @@
           <a:graphicData uri="http://schemas.openxmlformats.org/presentationml/2006/ole">
             <mc:AlternateContent xmlns:mc="http://schemas.openxmlformats.org/markup-compatibility/2006">
               <mc:Choice xmlns:v="urn:schemas-microsoft-com:vml" Requires="v">
-                <p:oleObj spid="_x0000_s493680" name="Equation" r:id="rId8" imgW="1346200" imgH="292100" progId="Equation.DSMT4">
+                <p:oleObj spid="_x0000_s493687" name="Equation" r:id="rId8" imgW="1346200" imgH="292100" progId="Equation.DSMT4">
                   <p:embed/>
                 </p:oleObj>
               </mc:Choice>
@@ -8313,13 +8313,13 @@
   <p:clrMapOvr>
     <a:masterClrMapping/>
   </p:clrMapOvr>
-  <mc:AlternateContent xmlns:mc="http://schemas.openxmlformats.org/markup-compatibility/2006">
-    <mc:Choice xmlns:p14="http://schemas.microsoft.com/office/powerpoint/2010/main" Requires="p14">
+  <mc:AlternateContent xmlns:mc="http://schemas.openxmlformats.org/markup-compatibility/2006" xmlns:p14="http://schemas.microsoft.com/office/powerpoint/2010/main">
+    <mc:Choice Requires="p14">
       <p:transition spd="med" p14:dur="700" advClick="0">
         <p:fade/>
       </p:transition>
     </mc:Choice>
-    <mc:Fallback>
+    <mc:Fallback xmlns="">
       <p:transition xmlns:p14="http://schemas.microsoft.com/office/powerpoint/2010/main" spd="med" advClick="0">
         <p:fade/>
       </p:transition>
@@ -9089,7 +9089,91 @@
   <p:timing>
     <p:tnLst>
       <p:par>
-        <p:cTn xmlns:p14="http://schemas.microsoft.com/office/powerpoint/2010/main" id="1" dur="indefinite" restart="never" nodeType="tmRoot"/>
+        <p:cTn xmlns:p14="http://schemas.microsoft.com/office/powerpoint/2010/main" id="1" dur="indefinite" restart="never" nodeType="tmRoot">
+          <p:childTnLst>
+            <p:seq concurrent="1" nextAc="seek">
+              <p:cTn id="2" dur="indefinite" nodeType="mainSeq">
+                <p:childTnLst>
+                  <p:par>
+                    <p:cTn id="3" fill="hold">
+                      <p:stCondLst>
+                        <p:cond delay="indefinite"/>
+                      </p:stCondLst>
+                      <p:childTnLst>
+                        <p:par>
+                          <p:cTn id="4" fill="hold">
+                            <p:stCondLst>
+                              <p:cond delay="0"/>
+                            </p:stCondLst>
+                            <p:childTnLst>
+                              <p:par>
+                                <p:cTn id="5" presetID="10" presetClass="entr" presetSubtype="0" fill="hold" nodeType="clickEffect">
+                                  <p:stCondLst>
+                                    <p:cond delay="0"/>
+                                  </p:stCondLst>
+                                  <p:childTnLst>
+                                    <p:set>
+                                      <p:cBhvr>
+                                        <p:cTn id="6" dur="1" fill="hold">
+                                          <p:stCondLst>
+                                            <p:cond delay="0"/>
+                                          </p:stCondLst>
+                                        </p:cTn>
+                                        <p:tgtEl>
+                                          <p:spTgt spid="3">
+                                            <p:txEl>
+                                              <p:pRg st="5" end="5"/>
+                                            </p:txEl>
+                                          </p:spTgt>
+                                        </p:tgtEl>
+                                        <p:attrNameLst>
+                                          <p:attrName>style.visibility</p:attrName>
+                                        </p:attrNameLst>
+                                      </p:cBhvr>
+                                      <p:to>
+                                        <p:strVal val="visible"/>
+                                      </p:to>
+                                    </p:set>
+                                    <p:animEffect transition="in" filter="fade">
+                                      <p:cBhvr>
+                                        <p:cTn id="7" dur="500"/>
+                                        <p:tgtEl>
+                                          <p:spTgt spid="3">
+                                            <p:txEl>
+                                              <p:pRg st="5" end="5"/>
+                                            </p:txEl>
+                                          </p:spTgt>
+                                        </p:tgtEl>
+                                      </p:cBhvr>
+                                    </p:animEffect>
+                                  </p:childTnLst>
+                                </p:cTn>
+                              </p:par>
+                            </p:childTnLst>
+                          </p:cTn>
+                        </p:par>
+                      </p:childTnLst>
+                    </p:cTn>
+                  </p:par>
+                </p:childTnLst>
+              </p:cTn>
+              <p:prevCondLst>
+                <p:cond evt="onPrev" delay="0">
+                  <p:tgtEl>
+                    <p:sldTgt/>
+                  </p:tgtEl>
+                </p:cond>
+              </p:prevCondLst>
+              <p:nextCondLst>
+                <p:cond evt="onNext" delay="0">
+                  <p:tgtEl>
+                    <p:sldTgt/>
+                  </p:tgtEl>
+                </p:cond>
+              </p:nextCondLst>
+            </p:seq>
+          </p:childTnLst>
+        </p:cTn>
       </p:par>
     </p:tnLst>
   </p:timing>
@@ -9434,7 +9518,7 @@
           <a:graphicData uri="http://schemas.openxmlformats.org/presentationml/2006/ole">
             <mc:AlternateContent xmlns:mc="http://schemas.openxmlformats.org/markup-compatibility/2006">
               <mc:Choice xmlns:v="urn:schemas-microsoft-com:vml" Requires="v">
-                <p:oleObj spid="_x0000_s1053" name="Equation" r:id="rId5" imgW="1828800" imgH="292100" progId="Equation.DSMT4">
+                <p:oleObj spid="_x0000_s1058" name="Equation" r:id="rId5" imgW="1828800" imgH="292100" progId="Equation.DSMT4">
                   <p:embed/>
                 </p:oleObj>
               </mc:Choice>
@@ -9504,7 +9588,7 @@
           <a:graphicData uri="http://schemas.openxmlformats.org/presentationml/2006/ole">
             <mc:AlternateContent xmlns:mc="http://schemas.openxmlformats.org/markup-compatibility/2006">
               <mc:Choice xmlns:v="urn:schemas-microsoft-com:vml" Requires="v">
-                <p:oleObj spid="_x0000_s1054" name="Equation" r:id="rId7" imgW="1828800" imgH="596900" progId="Equation.DSMT4">
+                <p:oleObj spid="_x0000_s1059" name="Equation" r:id="rId7" imgW="1828800" imgH="596900" progId="Equation.DSMT4">
                   <p:embed/>
                 </p:oleObj>
               </mc:Choice>
@@ -11864,7 +11948,7 @@
           <a:graphicData uri="http://schemas.openxmlformats.org/presentationml/2006/ole">
             <mc:AlternateContent xmlns:mc="http://schemas.openxmlformats.org/markup-compatibility/2006">
               <mc:Choice xmlns:v="urn:schemas-microsoft-com:vml" Requires="v">
-                <p:oleObj spid="_x0000_s426159" name="Equation" r:id="rId4" imgW="1866900" imgH="596900" progId="Equation.DSMT4">
+                <p:oleObj spid="_x0000_s426164" name="Equation" r:id="rId4" imgW="1866900" imgH="596900" progId="Equation.DSMT4">
                   <p:embed/>
                 </p:oleObj>
               </mc:Choice>
@@ -11963,7 +12047,7 @@
           <a:graphicData uri="http://schemas.openxmlformats.org/presentationml/2006/ole">
             <mc:AlternateContent xmlns:mc="http://schemas.openxmlformats.org/markup-compatibility/2006">
               <mc:Choice xmlns:v="urn:schemas-microsoft-com:vml" Requires="v">
-                <p:oleObj spid="_x0000_s426160" name="Equation" r:id="rId6" imgW="1866900" imgH="215900" progId="Equation.DSMT4">
+                <p:oleObj spid="_x0000_s426165" name="Equation" r:id="rId6" imgW="1866900" imgH="215900" progId="Equation.DSMT4">
                   <p:embed/>
                 </p:oleObj>
               </mc:Choice>
@@ -12182,7 +12266,7 @@
           <a:graphicData uri="http://schemas.openxmlformats.org/presentationml/2006/ole">
             <mc:AlternateContent xmlns:mc="http://schemas.openxmlformats.org/markup-compatibility/2006">
               <mc:Choice xmlns:v="urn:schemas-microsoft-com:vml" Requires="v">
-                <p:oleObj spid="_x0000_s494625" name="Equation" r:id="rId4" imgW="2057400" imgH="596900" progId="Equation.DSMT4">
+                <p:oleObj spid="_x0000_s494630" name="Equation" r:id="rId4" imgW="2057400" imgH="596900" progId="Equation.DSMT4">
                   <p:embed/>
                 </p:oleObj>
               </mc:Choice>
@@ -12282,7 +12366,7 @@
           <a:graphicData uri="http://schemas.openxmlformats.org/presentationml/2006/ole">
             <mc:AlternateContent xmlns:mc="http://schemas.openxmlformats.org/markup-compatibility/2006">
               <mc:Choice xmlns:v="urn:schemas-microsoft-com:vml" Requires="v">
-                <p:oleObj spid="_x0000_s494626" name="Equation" r:id="rId6" imgW="1866900" imgH="215900" progId="Equation.DSMT4">
+                <p:oleObj spid="_x0000_s494631" name="Equation" r:id="rId6" imgW="1866900" imgH="215900" progId="Equation.DSMT4">
                   <p:embed/>
                 </p:oleObj>
               </mc:Choice>

</xml_diff>